<commit_message>
Updated Report with accuracies for resnet and Google
</commit_message>
<xml_diff>
--- a/HoltSkinnerPoster.pptx
+++ b/HoltSkinnerPoster.pptx
@@ -303,7 +303,7 @@
             <a:fld id="{7D1D1846-4D87-4F31-A333-D6BE7DDC0D80}" type="datetimeFigureOut">
               <a:rPr lang="en-US" smtClean="0"/>
               <a:pPr/>
-              <a:t>5/4/18</a:t>
+              <a:t>5/5/18</a:t>
             </a:fld>
             <a:endParaRPr lang="en-US"/>
           </a:p>
@@ -468,7 +468,7 @@
             <a:fld id="{7D1D1846-4D87-4F31-A333-D6BE7DDC0D80}" type="datetimeFigureOut">
               <a:rPr lang="en-US" smtClean="0"/>
               <a:pPr/>
-              <a:t>5/4/18</a:t>
+              <a:t>5/5/18</a:t>
             </a:fld>
             <a:endParaRPr lang="en-US"/>
           </a:p>
@@ -643,7 +643,7 @@
             <a:fld id="{7D1D1846-4D87-4F31-A333-D6BE7DDC0D80}" type="datetimeFigureOut">
               <a:rPr lang="en-US" smtClean="0"/>
               <a:pPr/>
-              <a:t>5/4/18</a:t>
+              <a:t>5/5/18</a:t>
             </a:fld>
             <a:endParaRPr lang="en-US"/>
           </a:p>
@@ -808,7 +808,7 @@
             <a:fld id="{7D1D1846-4D87-4F31-A333-D6BE7DDC0D80}" type="datetimeFigureOut">
               <a:rPr lang="en-US" smtClean="0"/>
               <a:pPr/>
-              <a:t>5/4/18</a:t>
+              <a:t>5/5/18</a:t>
             </a:fld>
             <a:endParaRPr lang="en-US"/>
           </a:p>
@@ -1050,7 +1050,7 @@
             <a:fld id="{7D1D1846-4D87-4F31-A333-D6BE7DDC0D80}" type="datetimeFigureOut">
               <a:rPr lang="en-US" smtClean="0"/>
               <a:pPr/>
-              <a:t>5/4/18</a:t>
+              <a:t>5/5/18</a:t>
             </a:fld>
             <a:endParaRPr lang="en-US"/>
           </a:p>
@@ -1332,7 +1332,7 @@
             <a:fld id="{7D1D1846-4D87-4F31-A333-D6BE7DDC0D80}" type="datetimeFigureOut">
               <a:rPr lang="en-US" smtClean="0"/>
               <a:pPr/>
-              <a:t>5/4/18</a:t>
+              <a:t>5/5/18</a:t>
             </a:fld>
             <a:endParaRPr lang="en-US"/>
           </a:p>
@@ -1753,7 +1753,7 @@
             <a:fld id="{7D1D1846-4D87-4F31-A333-D6BE7DDC0D80}" type="datetimeFigureOut">
               <a:rPr lang="en-US" smtClean="0"/>
               <a:pPr/>
-              <a:t>5/4/18</a:t>
+              <a:t>5/5/18</a:t>
             </a:fld>
             <a:endParaRPr lang="en-US"/>
           </a:p>
@@ -1867,7 +1867,7 @@
             <a:fld id="{7D1D1846-4D87-4F31-A333-D6BE7DDC0D80}" type="datetimeFigureOut">
               <a:rPr lang="en-US" smtClean="0"/>
               <a:pPr/>
-              <a:t>5/4/18</a:t>
+              <a:t>5/5/18</a:t>
             </a:fld>
             <a:endParaRPr lang="en-US"/>
           </a:p>
@@ -1959,7 +1959,7 @@
             <a:fld id="{7D1D1846-4D87-4F31-A333-D6BE7DDC0D80}" type="datetimeFigureOut">
               <a:rPr lang="en-US" smtClean="0"/>
               <a:pPr/>
-              <a:t>5/4/18</a:t>
+              <a:t>5/5/18</a:t>
             </a:fld>
             <a:endParaRPr lang="en-US"/>
           </a:p>
@@ -2231,7 +2231,7 @@
             <a:fld id="{7D1D1846-4D87-4F31-A333-D6BE7DDC0D80}" type="datetimeFigureOut">
               <a:rPr lang="en-US" smtClean="0"/>
               <a:pPr/>
-              <a:t>5/4/18</a:t>
+              <a:t>5/5/18</a:t>
             </a:fld>
             <a:endParaRPr lang="en-US"/>
           </a:p>
@@ -2480,7 +2480,7 @@
             <a:fld id="{7D1D1846-4D87-4F31-A333-D6BE7DDC0D80}" type="datetimeFigureOut">
               <a:rPr lang="en-US" smtClean="0"/>
               <a:pPr/>
-              <a:t>5/4/18</a:t>
+              <a:t>5/5/18</a:t>
             </a:fld>
             <a:endParaRPr lang="en-US"/>
           </a:p>
@@ -2688,7 +2688,7 @@
             <a:fld id="{7D1D1846-4D87-4F31-A333-D6BE7DDC0D80}" type="datetimeFigureOut">
               <a:rPr lang="en-US" smtClean="0"/>
               <a:pPr/>
-              <a:t>5/4/18</a:t>
+              <a:t>5/5/18</a:t>
             </a:fld>
             <a:endParaRPr lang="en-US"/>
           </a:p>
@@ -3358,6 +3358,36 @@
             </a:r>
           </a:p>
           <a:p>
+            <a:pPr marL="2818272" lvl="1" indent="-571500">
+              <a:lnSpc>
+                <a:spcPct val="150000"/>
+              </a:lnSpc>
+              <a:buFont typeface="AppleColorEmoji" pitchFamily="2" charset="0"/>
+              <a:buChar char="🧠"/>
+            </a:pPr>
+            <a:r>
+              <a:rPr lang="en-US" sz="4400" dirty="0">
+                <a:ea typeface="Amazon Ember" panose="020B0603020204020204" pitchFamily="34" charset="0"/>
+                <a:cs typeface="Amazon Ember" panose="020B0603020204020204" pitchFamily="34" charset="0"/>
+              </a:rPr>
+              <a:t>Worked well on Dogs</a:t>
+            </a:r>
+            <a:r>
+              <a:rPr lang="en-US" sz="4400">
+                <a:ea typeface="Amazon Ember" panose="020B0603020204020204" pitchFamily="34" charset="0"/>
+                <a:cs typeface="Amazon Ember" panose="020B0603020204020204" pitchFamily="34" charset="0"/>
+              </a:rPr>
+              <a:t>, didn’t </a:t>
+            </a:r>
+            <a:r>
+              <a:rPr lang="en-US" sz="4400" dirty="0">
+                <a:ea typeface="Amazon Ember" panose="020B0603020204020204" pitchFamily="34" charset="0"/>
+                <a:cs typeface="Amazon Ember" panose="020B0603020204020204" pitchFamily="34" charset="0"/>
+              </a:rPr>
+              <a:t>work on Cats in Practice</a:t>
+            </a:r>
+          </a:p>
+          <a:p>
             <a:pPr marL="571500" indent="-571500">
               <a:lnSpc>
                 <a:spcPct val="150000"/>
@@ -3420,22 +3450,6 @@
             </a:r>
           </a:p>
           <a:p>
-            <a:pPr marL="571500" indent="-571500">
-              <a:lnSpc>
-                <a:spcPct val="150000"/>
-              </a:lnSpc>
-              <a:buFont typeface="AppleColorEmoji" pitchFamily="2" charset="0"/>
-              <a:buChar char="🧠"/>
-            </a:pPr>
-            <a:r>
-              <a:rPr lang="en-US" sz="4400" dirty="0">
-                <a:ea typeface="Amazon Ember" panose="020B0603020204020204" pitchFamily="34" charset="0"/>
-                <a:cs typeface="Amazon Ember" panose="020B0603020204020204" pitchFamily="34" charset="0"/>
-              </a:rPr>
-              <a:t>Amazon Rekognition</a:t>
-            </a:r>
-          </a:p>
-          <a:p>
             <a:pPr marL="2818272" lvl="1" indent="-571500">
               <a:lnSpc>
                 <a:spcPct val="150000"/>
@@ -3443,23 +3457,13 @@
               <a:buFont typeface="AppleColorEmoji" pitchFamily="2" charset="0"/>
               <a:buChar char="🧠"/>
             </a:pPr>
-            <a:endParaRPr lang="en-US" sz="4400" dirty="0">
-              <a:ea typeface="Amazon Ember" panose="020B0603020204020204" pitchFamily="34" charset="0"/>
-              <a:cs typeface="Amazon Ember" panose="020B0603020204020204" pitchFamily="34" charset="0"/>
-            </a:endParaRPr>
-          </a:p>
-          <a:p>
-            <a:pPr marL="2818272" lvl="1" indent="-571500">
-              <a:lnSpc>
-                <a:spcPct val="150000"/>
-              </a:lnSpc>
-              <a:buFont typeface="AppleColorEmoji" pitchFamily="2" charset="0"/>
-              <a:buChar char="🧠"/>
-            </a:pPr>
-            <a:endParaRPr lang="en-US" sz="4400" dirty="0">
-              <a:ea typeface="Amazon Ember" panose="020B0603020204020204" pitchFamily="34" charset="0"/>
-              <a:cs typeface="Amazon Ember" panose="020B0603020204020204" pitchFamily="34" charset="0"/>
-            </a:endParaRPr>
+            <a:r>
+              <a:rPr lang="en-US" sz="4400" dirty="0">
+                <a:ea typeface="Amazon Ember" panose="020B0603020204020204" pitchFamily="34" charset="0"/>
+                <a:cs typeface="Amazon Ember" panose="020B0603020204020204" pitchFamily="34" charset="0"/>
+              </a:rPr>
+              <a:t>Correctly Classified 100% of testing data (Before API limit was reached)</a:t>
+            </a:r>
           </a:p>
         </p:txBody>
       </p:sp>
@@ -3491,8 +3495,8 @@
         </p:blipFill>
         <p:spPr>
           <a:xfrm>
-            <a:off x="19805143" y="12979961"/>
-            <a:ext cx="10330543" cy="7747908"/>
+            <a:off x="19805143" y="12626504"/>
+            <a:ext cx="11027655" cy="8270742"/>
           </a:xfrm>
           <a:prstGeom prst="rect">
             <a:avLst/>
@@ -3527,111 +3531,1233 @@
         </p:blipFill>
         <p:spPr>
           <a:xfrm rot="5400000">
-            <a:off x="31055929" y="13691615"/>
-            <a:ext cx="8432800" cy="6324600"/>
+            <a:off x="31091272" y="13968889"/>
+            <a:ext cx="7911423" cy="5933567"/>
           </a:xfrm>
           <a:prstGeom prst="rect">
             <a:avLst/>
           </a:prstGeom>
         </p:spPr>
       </p:pic>
-      <p:sp>
-        <p:nvSpPr>
-          <p:cNvPr id="25" name="TextBox 24">
+      <p:graphicFrame>
+        <p:nvGraphicFramePr>
+          <p:cNvPr id="10" name="Table 9">
             <a:extLst>
               <a:ext uri="{FF2B5EF4-FFF2-40B4-BE49-F238E27FC236}">
-                <a16:creationId xmlns:a16="http://schemas.microsoft.com/office/drawing/2014/main" id="{EDEA142E-4F43-5B42-B394-EDB0011F26FC}"/>
+                <a16:creationId xmlns:a16="http://schemas.microsoft.com/office/drawing/2014/main" id="{4BAB508D-CA7F-3B47-B463-ED64859ACEA8}"/>
               </a:ext>
             </a:extLst>
           </p:cNvPr>
-          <p:cNvSpPr txBox="1"/>
-          <p:nvPr/>
-        </p:nvSpPr>
-        <p:spPr>
-          <a:xfrm>
-            <a:off x="30753344" y="21564600"/>
-            <a:ext cx="9037970" cy="4511684"/>
-          </a:xfrm>
-          <a:prstGeom prst="rect">
-            <a:avLst/>
-          </a:prstGeom>
-          <a:noFill/>
-          <a:ln>
-            <a:solidFill>
-              <a:schemeClr val="tx1"/>
-            </a:solidFill>
-          </a:ln>
-        </p:spPr>
-        <p:txBody>
-          <a:bodyPr wrap="square" lIns="274320" tIns="182880" bIns="365760" rtlCol="0" anchor="ctr">
-            <a:spAutoFit/>
-          </a:bodyPr>
-          <a:lstStyle/>
-          <a:p>
-            <a:pPr>
-              <a:lnSpc>
-                <a:spcPct val="150000"/>
-              </a:lnSpc>
-            </a:pPr>
-            <a:r>
-              <a:rPr lang="en-US" sz="4400" b="1" dirty="0">
-                <a:ea typeface="Amazon Ember" panose="020B0603020204020204" pitchFamily="34" charset="0"/>
-                <a:cs typeface="Amazon Ember" panose="020B0603020204020204" pitchFamily="34" charset="0"/>
-              </a:rPr>
-              <a:t>Homemade: </a:t>
-            </a:r>
-            <a:r>
-              <a:rPr lang="en-US" sz="4400" dirty="0">
-                <a:ea typeface="Amazon Ember" panose="020B0603020204020204" pitchFamily="34" charset="0"/>
-                <a:cs typeface="Amazon Ember" panose="020B0603020204020204" pitchFamily="34" charset="0"/>
-              </a:rPr>
-              <a:t>Cat</a:t>
-            </a:r>
-          </a:p>
-          <a:p>
-            <a:pPr>
-              <a:lnSpc>
-                <a:spcPct val="150000"/>
-              </a:lnSpc>
-            </a:pPr>
-            <a:r>
-              <a:rPr lang="en-US" sz="4400" b="1" dirty="0">
-                <a:ea typeface="Amazon Ember" panose="020B0603020204020204" pitchFamily="34" charset="0"/>
-                <a:cs typeface="Amazon Ember" panose="020B0603020204020204" pitchFamily="34" charset="0"/>
-              </a:rPr>
-              <a:t>ResNet50: </a:t>
-            </a:r>
-            <a:r>
-              <a:rPr lang="en-US" sz="4400" dirty="0">
-                <a:ea typeface="Amazon Ember" panose="020B0603020204020204" pitchFamily="34" charset="0"/>
-                <a:cs typeface="Amazon Ember" panose="020B0603020204020204" pitchFamily="34" charset="0"/>
-              </a:rPr>
-              <a:t>Siberian Husky 40%, Seat Belt 7.96%, Siamese Cat 7.82%</a:t>
-            </a:r>
-          </a:p>
-          <a:p>
-            <a:pPr>
-              <a:lnSpc>
-                <a:spcPct val="150000"/>
-              </a:lnSpc>
-            </a:pPr>
-            <a:r>
-              <a:rPr lang="en-US" sz="4400" b="1" dirty="0" err="1">
-                <a:ea typeface="Amazon Ember" panose="020B0603020204020204" pitchFamily="34" charset="0"/>
-                <a:cs typeface="Amazon Ember" panose="020B0603020204020204" pitchFamily="34" charset="0"/>
-              </a:rPr>
-              <a:t>MobileNet</a:t>
-            </a:r>
-            <a:r>
-              <a:rPr lang="en-US" sz="4400" b="1" dirty="0">
-                <a:ea typeface="Amazon Ember" panose="020B0603020204020204" pitchFamily="34" charset="0"/>
-                <a:cs typeface="Amazon Ember" panose="020B0603020204020204" pitchFamily="34" charset="0"/>
-              </a:rPr>
-              <a:t>:</a:t>
-            </a:r>
-          </a:p>
-        </p:txBody>
-      </p:sp>
+          <p:cNvGraphicFramePr>
+            <a:graphicFrameLocks noGrp="1"/>
+          </p:cNvGraphicFramePr>
+          <p:nvPr>
+            <p:extLst>
+              <p:ext uri="{D42A27DB-BD31-4B8C-83A1-F6EECF244321}">
+                <p14:modId xmlns:p14="http://schemas.microsoft.com/office/powerpoint/2010/main" val="3586389773"/>
+              </p:ext>
+            </p:extLst>
+          </p:nvPr>
+        </p:nvGraphicFramePr>
+        <p:xfrm>
+          <a:off x="19042741" y="22250400"/>
+          <a:ext cx="20553468" cy="3379175"/>
+        </p:xfrm>
+        <a:graphic>
+          <a:graphicData uri="http://schemas.openxmlformats.org/drawingml/2006/table">
+            <a:tbl>
+              <a:tblPr firstRow="1" bandRow="1">
+                <a:tableStyleId>{2D5ABB26-0587-4C30-8999-92F81FD0307C}</a:tableStyleId>
+              </a:tblPr>
+              <a:tblGrid>
+                <a:gridCol w="2618641">
+                  <a:extLst>
+                    <a:ext uri="{9D8B030D-6E8A-4147-A177-3AD203B41FA5}">
+                      <a16:colId xmlns:a16="http://schemas.microsoft.com/office/drawing/2014/main" val="20000"/>
+                    </a:ext>
+                  </a:extLst>
+                </a:gridCol>
+                <a:gridCol w="208280">
+                  <a:extLst>
+                    <a:ext uri="{9D8B030D-6E8A-4147-A177-3AD203B41FA5}">
+                      <a16:colId xmlns:a16="http://schemas.microsoft.com/office/drawing/2014/main" val="20001"/>
+                    </a:ext>
+                  </a:extLst>
+                </a:gridCol>
+                <a:gridCol w="2410347">
+                  <a:extLst>
+                    <a:ext uri="{9D8B030D-6E8A-4147-A177-3AD203B41FA5}">
+                      <a16:colId xmlns:a16="http://schemas.microsoft.com/office/drawing/2014/main" val="20002"/>
+                    </a:ext>
+                  </a:extLst>
+                </a:gridCol>
+                <a:gridCol w="4953000">
+                  <a:extLst>
+                    <a:ext uri="{9D8B030D-6E8A-4147-A177-3AD203B41FA5}">
+                      <a16:colId xmlns:a16="http://schemas.microsoft.com/office/drawing/2014/main" val="20003"/>
+                    </a:ext>
+                  </a:extLst>
+                </a:gridCol>
+                <a:gridCol w="6019800">
+                  <a:extLst>
+                    <a:ext uri="{9D8B030D-6E8A-4147-A177-3AD203B41FA5}">
+                      <a16:colId xmlns:a16="http://schemas.microsoft.com/office/drawing/2014/main" val="20005"/>
+                    </a:ext>
+                  </a:extLst>
+                </a:gridCol>
+                <a:gridCol w="4343400">
+                  <a:extLst>
+                    <a:ext uri="{9D8B030D-6E8A-4147-A177-3AD203B41FA5}">
+                      <a16:colId xmlns:a16="http://schemas.microsoft.com/office/drawing/2014/main" val="20007"/>
+                    </a:ext>
+                  </a:extLst>
+                </a:gridCol>
+              </a:tblGrid>
+              <a:tr h="778850">
+                <a:tc>
+                  <a:txBody>
+                    <a:bodyPr/>
+                    <a:lstStyle/>
+                    <a:p>
+                      <a:pPr lvl="0" algn="ctr" fontAlgn="b"/>
+                      <a:endParaRPr lang="en-US" sz="2800" b="1" i="0" u="none" strike="noStrike" dirty="0">
+                        <a:solidFill>
+                          <a:srgbClr val="000000"/>
+                        </a:solidFill>
+                        <a:latin typeface="Calibri"/>
+                      </a:endParaRPr>
+                    </a:p>
+                  </a:txBody>
+                  <a:tcPr anchor="b">
+                    <a:lnL w="12700" cap="flat" cmpd="sng" algn="ctr">
+                      <a:noFill/>
+                      <a:prstDash val="solid"/>
+                      <a:round/>
+                      <a:headEnd type="none" w="med" len="med"/>
+                      <a:tailEnd type="none" w="med" len="med"/>
+                    </a:lnL>
+                    <a:lnR w="38100" cap="flat" cmpd="sng" algn="ctr">
+                      <a:solidFill>
+                        <a:schemeClr val="tx1"/>
+                      </a:solidFill>
+                      <a:prstDash val="solid"/>
+                      <a:round/>
+                      <a:headEnd type="none" w="med" len="med"/>
+                      <a:tailEnd type="none" w="med" len="med"/>
+                    </a:lnR>
+                    <a:lnT w="38100" cap="flat" cmpd="sng" algn="ctr">
+                      <a:noFill/>
+                      <a:prstDash val="solid"/>
+                      <a:round/>
+                      <a:headEnd type="none" w="med" len="med"/>
+                      <a:tailEnd type="none" w="med" len="med"/>
+                    </a:lnT>
+                    <a:lnB w="38100" cap="flat" cmpd="sng" algn="ctr">
+                      <a:solidFill>
+                        <a:schemeClr val="tx1"/>
+                      </a:solidFill>
+                      <a:prstDash val="solid"/>
+                      <a:round/>
+                      <a:headEnd type="none" w="med" len="med"/>
+                      <a:tailEnd type="none" w="med" len="med"/>
+                    </a:lnB>
+                  </a:tcPr>
+                </a:tc>
+                <a:tc gridSpan="2">
+                  <a:txBody>
+                    <a:bodyPr/>
+                    <a:lstStyle/>
+                    <a:p>
+                      <a:pPr lvl="0" algn="ctr" fontAlgn="b"/>
+                      <a:r>
+                        <a:rPr lang="en-US" sz="3600" b="1" i="0" u="none" strike="noStrike" dirty="0">
+                          <a:solidFill>
+                            <a:schemeClr val="bg1"/>
+                          </a:solidFill>
+                          <a:latin typeface="Calibri"/>
+                        </a:rPr>
+                        <a:t>Homemade</a:t>
+                      </a:r>
+                    </a:p>
+                  </a:txBody>
+                  <a:tcPr anchor="b">
+                    <a:lnL w="38100" cap="flat" cmpd="sng" algn="ctr">
+                      <a:solidFill>
+                        <a:schemeClr val="tx1"/>
+                      </a:solidFill>
+                      <a:prstDash val="solid"/>
+                      <a:round/>
+                      <a:headEnd type="none" w="med" len="med"/>
+                      <a:tailEnd type="none" w="med" len="med"/>
+                    </a:lnL>
+                    <a:lnR w="38100" cap="flat" cmpd="sng" algn="ctr">
+                      <a:solidFill>
+                        <a:schemeClr val="tx1"/>
+                      </a:solidFill>
+                      <a:prstDash val="solid"/>
+                      <a:round/>
+                      <a:headEnd type="none" w="med" len="med"/>
+                      <a:tailEnd type="none" w="med" len="med"/>
+                    </a:lnR>
+                    <a:lnT w="38100" cap="flat" cmpd="sng" algn="ctr">
+                      <a:noFill/>
+                      <a:prstDash val="solid"/>
+                      <a:round/>
+                      <a:headEnd type="none" w="med" len="med"/>
+                      <a:tailEnd type="none" w="med" len="med"/>
+                    </a:lnT>
+                    <a:lnB w="38100" cap="flat" cmpd="sng" algn="ctr">
+                      <a:solidFill>
+                        <a:schemeClr val="tx1"/>
+                      </a:solidFill>
+                      <a:prstDash val="solid"/>
+                      <a:round/>
+                      <a:headEnd type="none" w="med" len="med"/>
+                      <a:tailEnd type="none" w="med" len="med"/>
+                    </a:lnB>
+                    <a:solidFill>
+                      <a:srgbClr val="347FB0"/>
+                    </a:solidFill>
+                  </a:tcPr>
+                </a:tc>
+                <a:tc hMerge="1">
+                  <a:txBody>
+                    <a:bodyPr/>
+                    <a:lstStyle/>
+                    <a:p>
+                      <a:endParaRPr lang="en-US"/>
+                    </a:p>
+                  </a:txBody>
+                  <a:tcPr/>
+                </a:tc>
+                <a:tc>
+                  <a:txBody>
+                    <a:bodyPr/>
+                    <a:lstStyle/>
+                    <a:p>
+                      <a:pPr lvl="0" algn="ctr" fontAlgn="b"/>
+                      <a:r>
+                        <a:rPr lang="en-US" sz="3600" b="1" i="0" u="none" strike="noStrike" dirty="0">
+                          <a:solidFill>
+                            <a:schemeClr val="bg1"/>
+                          </a:solidFill>
+                          <a:latin typeface="Calibri"/>
+                        </a:rPr>
+                        <a:t>ResNet50</a:t>
+                      </a:r>
+                    </a:p>
+                  </a:txBody>
+                  <a:tcPr anchor="b">
+                    <a:lnL w="38100" cap="flat" cmpd="sng" algn="ctr">
+                      <a:solidFill>
+                        <a:schemeClr val="tx1"/>
+                      </a:solidFill>
+                      <a:prstDash val="solid"/>
+                      <a:round/>
+                      <a:headEnd type="none" w="med" len="med"/>
+                      <a:tailEnd type="none" w="med" len="med"/>
+                    </a:lnL>
+                    <a:lnR w="38100" cap="flat" cmpd="sng" algn="ctr">
+                      <a:solidFill>
+                        <a:schemeClr val="tx1"/>
+                      </a:solidFill>
+                      <a:prstDash val="solid"/>
+                      <a:round/>
+                      <a:headEnd type="none" w="med" len="med"/>
+                      <a:tailEnd type="none" w="med" len="med"/>
+                    </a:lnR>
+                    <a:lnT w="38100" cap="flat" cmpd="sng" algn="ctr">
+                      <a:noFill/>
+                      <a:prstDash val="solid"/>
+                      <a:round/>
+                      <a:headEnd type="none" w="med" len="med"/>
+                      <a:tailEnd type="none" w="med" len="med"/>
+                    </a:lnT>
+                    <a:lnB w="38100" cap="flat" cmpd="sng" algn="ctr">
+                      <a:solidFill>
+                        <a:schemeClr val="tx1"/>
+                      </a:solidFill>
+                      <a:prstDash val="solid"/>
+                      <a:round/>
+                      <a:headEnd type="none" w="med" len="med"/>
+                      <a:tailEnd type="none" w="med" len="med"/>
+                    </a:lnB>
+                    <a:solidFill>
+                      <a:srgbClr val="347FB0"/>
+                    </a:solidFill>
+                  </a:tcPr>
+                </a:tc>
+                <a:tc>
+                  <a:txBody>
+                    <a:bodyPr/>
+                    <a:lstStyle/>
+                    <a:p>
+                      <a:pPr lvl="0" algn="ctr" fontAlgn="b"/>
+                      <a:r>
+                        <a:rPr lang="en-US" sz="3600" b="1" i="0" u="none" strike="noStrike" dirty="0" err="1">
+                          <a:solidFill>
+                            <a:schemeClr val="bg1"/>
+                          </a:solidFill>
+                          <a:latin typeface="Calibri"/>
+                        </a:rPr>
+                        <a:t>MobileNet</a:t>
+                      </a:r>
+                      <a:endParaRPr lang="en-US" sz="3600" b="1" i="0" u="none" strike="noStrike" dirty="0">
+                        <a:solidFill>
+                          <a:schemeClr val="bg1"/>
+                        </a:solidFill>
+                        <a:latin typeface="Calibri"/>
+                      </a:endParaRPr>
+                    </a:p>
+                  </a:txBody>
+                  <a:tcPr anchor="b">
+                    <a:lnL w="38100" cap="flat" cmpd="sng" algn="ctr">
+                      <a:solidFill>
+                        <a:schemeClr val="tx1"/>
+                      </a:solidFill>
+                      <a:prstDash val="solid"/>
+                      <a:round/>
+                      <a:headEnd type="none" w="med" len="med"/>
+                      <a:tailEnd type="none" w="med" len="med"/>
+                    </a:lnL>
+                    <a:lnR w="38100" cap="flat" cmpd="sng" algn="ctr">
+                      <a:solidFill>
+                        <a:schemeClr val="tx1"/>
+                      </a:solidFill>
+                      <a:prstDash val="solid"/>
+                      <a:round/>
+                      <a:headEnd type="none" w="med" len="med"/>
+                      <a:tailEnd type="none" w="med" len="med"/>
+                    </a:lnR>
+                    <a:lnT w="38100" cap="flat" cmpd="sng" algn="ctr">
+                      <a:noFill/>
+                      <a:prstDash val="solid"/>
+                      <a:round/>
+                      <a:headEnd type="none" w="med" len="med"/>
+                      <a:tailEnd type="none" w="med" len="med"/>
+                    </a:lnT>
+                    <a:lnB w="38100" cap="flat" cmpd="sng" algn="ctr">
+                      <a:solidFill>
+                        <a:schemeClr val="tx1"/>
+                      </a:solidFill>
+                      <a:prstDash val="solid"/>
+                      <a:round/>
+                      <a:headEnd type="none" w="med" len="med"/>
+                      <a:tailEnd type="none" w="med" len="med"/>
+                    </a:lnB>
+                    <a:solidFill>
+                      <a:srgbClr val="347FB0"/>
+                    </a:solidFill>
+                  </a:tcPr>
+                </a:tc>
+                <a:tc>
+                  <a:txBody>
+                    <a:bodyPr/>
+                    <a:lstStyle/>
+                    <a:p>
+                      <a:pPr lvl="0" algn="ctr" fontAlgn="b"/>
+                      <a:r>
+                        <a:rPr lang="en-US" sz="3600" b="1" i="0" u="none" strike="noStrike" dirty="0">
+                          <a:solidFill>
+                            <a:schemeClr val="bg1"/>
+                          </a:solidFill>
+                          <a:latin typeface="Calibri"/>
+                        </a:rPr>
+                        <a:t>Google</a:t>
+                      </a:r>
+                    </a:p>
+                  </a:txBody>
+                  <a:tcPr anchor="b">
+                    <a:lnL w="38100" cap="flat" cmpd="sng" algn="ctr">
+                      <a:solidFill>
+                        <a:schemeClr val="tx1"/>
+                      </a:solidFill>
+                      <a:prstDash val="solid"/>
+                      <a:round/>
+                      <a:headEnd type="none" w="med" len="med"/>
+                      <a:tailEnd type="none" w="med" len="med"/>
+                    </a:lnL>
+                    <a:lnR w="38100" cap="flat" cmpd="sng" algn="ctr">
+                      <a:solidFill>
+                        <a:schemeClr val="tx1"/>
+                      </a:solidFill>
+                      <a:prstDash val="solid"/>
+                      <a:round/>
+                      <a:headEnd type="none" w="med" len="med"/>
+                      <a:tailEnd type="none" w="med" len="med"/>
+                    </a:lnR>
+                    <a:lnT w="38100" cap="flat" cmpd="sng" algn="ctr">
+                      <a:noFill/>
+                      <a:prstDash val="solid"/>
+                      <a:round/>
+                      <a:headEnd type="none" w="med" len="med"/>
+                      <a:tailEnd type="none" w="med" len="med"/>
+                    </a:lnT>
+                    <a:lnB w="38100" cap="flat" cmpd="sng" algn="ctr">
+                      <a:solidFill>
+                        <a:schemeClr val="tx1"/>
+                      </a:solidFill>
+                      <a:prstDash val="solid"/>
+                      <a:round/>
+                      <a:headEnd type="none" w="med" len="med"/>
+                      <a:tailEnd type="none" w="med" len="med"/>
+                    </a:lnB>
+                    <a:solidFill>
+                      <a:srgbClr val="347FB0"/>
+                    </a:solidFill>
+                  </a:tcPr>
+                </a:tc>
+                <a:extLst>
+                  <a:ext uri="{0D108BD9-81ED-4DB2-BD59-A6C34878D82A}">
+                    <a16:rowId xmlns:a16="http://schemas.microsoft.com/office/drawing/2014/main" val="10000"/>
+                  </a:ext>
+                </a:extLst>
+              </a:tr>
+              <a:tr h="807320">
+                <a:tc rowSpan="2">
+                  <a:txBody>
+                    <a:bodyPr/>
+                    <a:lstStyle/>
+                    <a:p>
+                      <a:pPr lvl="0" algn="ctr" fontAlgn="b"/>
+                      <a:r>
+                        <a:rPr lang="en-US" sz="3600" b="0" i="0" u="none" strike="noStrike" dirty="0">
+                          <a:solidFill>
+                            <a:srgbClr val="000000"/>
+                          </a:solidFill>
+                          <a:latin typeface="Calibri"/>
+                        </a:rPr>
+                        <a:t>Class</a:t>
+                      </a:r>
+                    </a:p>
+                  </a:txBody>
+                  <a:tcPr anchor="ctr">
+                    <a:lnL w="38100" cap="flat" cmpd="sng" algn="ctr">
+                      <a:noFill/>
+                      <a:prstDash val="solid"/>
+                      <a:round/>
+                      <a:headEnd type="none" w="med" len="med"/>
+                      <a:tailEnd type="none" w="med" len="med"/>
+                    </a:lnL>
+                    <a:lnR w="38100" cap="flat" cmpd="sng" algn="ctr">
+                      <a:solidFill>
+                        <a:schemeClr val="tx1"/>
+                      </a:solidFill>
+                      <a:prstDash val="solid"/>
+                      <a:round/>
+                      <a:headEnd type="none" w="med" len="med"/>
+                      <a:tailEnd type="none" w="med" len="med"/>
+                    </a:lnR>
+                    <a:lnT w="38100" cap="flat" cmpd="sng" algn="ctr">
+                      <a:solidFill>
+                        <a:schemeClr val="tx1"/>
+                      </a:solidFill>
+                      <a:prstDash val="solid"/>
+                      <a:round/>
+                      <a:headEnd type="none" w="med" len="med"/>
+                      <a:tailEnd type="none" w="med" len="med"/>
+                    </a:lnT>
+                    <a:lnB w="38100" cap="flat" cmpd="sng" algn="ctr">
+                      <a:solidFill>
+                        <a:schemeClr val="tx1"/>
+                      </a:solidFill>
+                      <a:prstDash val="solid"/>
+                      <a:round/>
+                      <a:headEnd type="none" w="med" len="med"/>
+                      <a:tailEnd type="none" w="med" len="med"/>
+                    </a:lnB>
+                    <a:solidFill>
+                      <a:schemeClr val="bg1">
+                        <a:lumMod val="95000"/>
+                      </a:schemeClr>
+                    </a:solidFill>
+                  </a:tcPr>
+                </a:tc>
+                <a:tc>
+                  <a:txBody>
+                    <a:bodyPr/>
+                    <a:lstStyle/>
+                    <a:p>
+                      <a:pPr lvl="0" algn="ctr" fontAlgn="b"/>
+                      <a:endParaRPr lang="en-US" sz="4400" b="0" i="0" u="none" strike="noStrike">
+                        <a:solidFill>
+                          <a:srgbClr val="000000"/>
+                        </a:solidFill>
+                        <a:latin typeface="Calibri"/>
+                      </a:endParaRPr>
+                    </a:p>
+                  </a:txBody>
+                  <a:tcPr anchor="ctr">
+                    <a:lnL w="38100" cap="flat" cmpd="sng" algn="ctr">
+                      <a:solidFill>
+                        <a:schemeClr val="tx1"/>
+                      </a:solidFill>
+                      <a:prstDash val="solid"/>
+                      <a:round/>
+                      <a:headEnd type="none" w="med" len="med"/>
+                      <a:tailEnd type="none" w="med" len="med"/>
+                    </a:lnL>
+                    <a:lnT w="38100" cap="flat" cmpd="sng" algn="ctr">
+                      <a:solidFill>
+                        <a:schemeClr val="tx1"/>
+                      </a:solidFill>
+                      <a:prstDash val="solid"/>
+                      <a:round/>
+                      <a:headEnd type="none" w="med" len="med"/>
+                      <a:tailEnd type="none" w="med" len="med"/>
+                    </a:lnT>
+                  </a:tcPr>
+                </a:tc>
+                <a:tc rowSpan="2">
+                  <a:txBody>
+                    <a:bodyPr/>
+                    <a:lstStyle/>
+                    <a:p>
+                      <a:pPr lvl="0" algn="l" fontAlgn="b"/>
+                      <a:r>
+                        <a:rPr lang="en-US" sz="4400" b="0" i="0" u="none" strike="noStrike" dirty="0">
+                          <a:solidFill>
+                            <a:srgbClr val="000000"/>
+                          </a:solidFill>
+                          <a:latin typeface="Calibri"/>
+                        </a:rPr>
+                        <a:t>Cat</a:t>
+                      </a:r>
+                    </a:p>
+                  </a:txBody>
+                  <a:tcPr anchor="ctr">
+                    <a:lnR w="38100" cap="flat" cmpd="sng" algn="ctr">
+                      <a:solidFill>
+                        <a:schemeClr val="tx1"/>
+                      </a:solidFill>
+                      <a:prstDash val="solid"/>
+                      <a:round/>
+                      <a:headEnd type="none" w="med" len="med"/>
+                      <a:tailEnd type="none" w="med" len="med"/>
+                    </a:lnR>
+                    <a:lnT w="38100" cap="flat" cmpd="sng" algn="ctr">
+                      <a:solidFill>
+                        <a:schemeClr val="tx1"/>
+                      </a:solidFill>
+                      <a:prstDash val="solid"/>
+                      <a:round/>
+                      <a:headEnd type="none" w="med" len="med"/>
+                      <a:tailEnd type="none" w="med" len="med"/>
+                    </a:lnT>
+                    <a:lnB w="38100" cap="flat" cmpd="sng" algn="ctr">
+                      <a:solidFill>
+                        <a:schemeClr val="tx1"/>
+                      </a:solidFill>
+                      <a:prstDash val="solid"/>
+                      <a:round/>
+                      <a:headEnd type="none" w="med" len="med"/>
+                      <a:tailEnd type="none" w="med" len="med"/>
+                    </a:lnB>
+                  </a:tcPr>
+                </a:tc>
+                <a:tc rowSpan="2">
+                  <a:txBody>
+                    <a:bodyPr/>
+                    <a:lstStyle/>
+                    <a:p>
+                      <a:pPr lvl="0" algn="l" fontAlgn="b"/>
+                      <a:r>
+                        <a:rPr lang="en-US" sz="4400" b="0" i="0" u="none" strike="noStrike" dirty="0">
+                          <a:solidFill>
+                            <a:srgbClr val="000000"/>
+                          </a:solidFill>
+                          <a:latin typeface="Calibri"/>
+                        </a:rPr>
+                        <a:t>Siberian Husky: 40%</a:t>
+                      </a:r>
+                    </a:p>
+                    <a:p>
+                      <a:pPr lvl="0" algn="l" fontAlgn="b"/>
+                      <a:r>
+                        <a:rPr lang="en-US" sz="4400" b="0" i="0" u="none" strike="noStrike" dirty="0">
+                          <a:solidFill>
+                            <a:srgbClr val="000000"/>
+                          </a:solidFill>
+                          <a:latin typeface="Calibri"/>
+                        </a:rPr>
+                        <a:t>Seat Belt: 7.96%</a:t>
+                      </a:r>
+                    </a:p>
+                    <a:p>
+                      <a:pPr lvl="0" algn="l" fontAlgn="b"/>
+                      <a:r>
+                        <a:rPr lang="en-US" sz="4400" b="0" i="0" u="none" strike="noStrike" dirty="0">
+                          <a:solidFill>
+                            <a:srgbClr val="000000"/>
+                          </a:solidFill>
+                          <a:latin typeface="Calibri"/>
+                        </a:rPr>
+                        <a:t>Siamese Cat: 7.82%</a:t>
+                      </a:r>
+                    </a:p>
+                  </a:txBody>
+                  <a:tcPr anchor="ctr">
+                    <a:lnL w="38100" cap="flat" cmpd="sng" algn="ctr">
+                      <a:solidFill>
+                        <a:schemeClr val="tx1"/>
+                      </a:solidFill>
+                      <a:prstDash val="solid"/>
+                      <a:round/>
+                      <a:headEnd type="none" w="med" len="med"/>
+                      <a:tailEnd type="none" w="med" len="med"/>
+                    </a:lnL>
+                    <a:lnR w="38100" cap="flat" cmpd="sng" algn="ctr">
+                      <a:solidFill>
+                        <a:schemeClr val="tx1"/>
+                      </a:solidFill>
+                      <a:prstDash val="solid"/>
+                      <a:round/>
+                      <a:headEnd type="none" w="med" len="med"/>
+                      <a:tailEnd type="none" w="med" len="med"/>
+                    </a:lnR>
+                    <a:lnT w="38100" cap="flat" cmpd="sng" algn="ctr">
+                      <a:solidFill>
+                        <a:schemeClr val="tx1"/>
+                      </a:solidFill>
+                      <a:prstDash val="solid"/>
+                      <a:round/>
+                      <a:headEnd type="none" w="med" len="med"/>
+                      <a:tailEnd type="none" w="med" len="med"/>
+                    </a:lnT>
+                    <a:lnB w="38100" cap="flat" cmpd="sng" algn="ctr">
+                      <a:solidFill>
+                        <a:schemeClr val="tx1"/>
+                      </a:solidFill>
+                      <a:prstDash val="solid"/>
+                      <a:round/>
+                      <a:headEnd type="none" w="med" len="med"/>
+                      <a:tailEnd type="none" w="med" len="med"/>
+                    </a:lnB>
+                  </a:tcPr>
+                </a:tc>
+                <a:tc rowSpan="2">
+                  <a:txBody>
+                    <a:bodyPr/>
+                    <a:lstStyle/>
+                    <a:p>
+                      <a:pPr lvl="0" algn="l" fontAlgn="b"/>
+                      <a:r>
+                        <a:rPr lang="en-US" sz="4400" b="0" i="0" u="none" strike="noStrike" dirty="0">
+                          <a:solidFill>
+                            <a:srgbClr val="000000"/>
+                          </a:solidFill>
+                          <a:latin typeface="Calibri"/>
+                        </a:rPr>
+                        <a:t>Weasel: 12.55%</a:t>
+                      </a:r>
+                    </a:p>
+                    <a:p>
+                      <a:pPr lvl="0" algn="l" fontAlgn="b"/>
+                      <a:r>
+                        <a:rPr lang="en-US" sz="4400" b="0" i="0" u="none" strike="noStrike" dirty="0">
+                          <a:solidFill>
+                            <a:srgbClr val="000000"/>
+                          </a:solidFill>
+                          <a:latin typeface="Calibri"/>
+                        </a:rPr>
+                        <a:t>Siberian Husky: 10.84%</a:t>
+                      </a:r>
+                    </a:p>
+                    <a:p>
+                      <a:pPr lvl="0" algn="l" fontAlgn="b"/>
+                      <a:r>
+                        <a:rPr lang="en-US" sz="4400" b="0" i="0" u="none" strike="noStrike" dirty="0">
+                          <a:solidFill>
+                            <a:srgbClr val="000000"/>
+                          </a:solidFill>
+                          <a:latin typeface="Calibri"/>
+                        </a:rPr>
+                        <a:t>Siamese Cat: 8.74%</a:t>
+                      </a:r>
+                    </a:p>
+                  </a:txBody>
+                  <a:tcPr anchor="ctr">
+                    <a:lnL w="38100" cap="flat" cmpd="sng" algn="ctr">
+                      <a:solidFill>
+                        <a:schemeClr val="tx1"/>
+                      </a:solidFill>
+                      <a:prstDash val="solid"/>
+                      <a:round/>
+                      <a:headEnd type="none" w="med" len="med"/>
+                      <a:tailEnd type="none" w="med" len="med"/>
+                    </a:lnL>
+                    <a:lnR w="38100" cap="flat" cmpd="sng" algn="ctr">
+                      <a:solidFill>
+                        <a:schemeClr val="tx1"/>
+                      </a:solidFill>
+                      <a:prstDash val="solid"/>
+                      <a:round/>
+                      <a:headEnd type="none" w="med" len="med"/>
+                      <a:tailEnd type="none" w="med" len="med"/>
+                    </a:lnR>
+                    <a:lnT w="38100" cap="flat" cmpd="sng" algn="ctr">
+                      <a:solidFill>
+                        <a:schemeClr val="tx1"/>
+                      </a:solidFill>
+                      <a:prstDash val="solid"/>
+                      <a:round/>
+                      <a:headEnd type="none" w="med" len="med"/>
+                      <a:tailEnd type="none" w="med" len="med"/>
+                    </a:lnT>
+                    <a:lnB w="38100" cap="flat" cmpd="sng" algn="ctr">
+                      <a:solidFill>
+                        <a:schemeClr val="tx1"/>
+                      </a:solidFill>
+                      <a:prstDash val="solid"/>
+                      <a:round/>
+                      <a:headEnd type="none" w="med" len="med"/>
+                      <a:tailEnd type="none" w="med" len="med"/>
+                    </a:lnB>
+                  </a:tcPr>
+                </a:tc>
+                <a:tc rowSpan="2">
+                  <a:txBody>
+                    <a:bodyPr/>
+                    <a:lstStyle/>
+                    <a:p>
+                      <a:pPr lvl="0" algn="l" fontAlgn="b"/>
+                      <a:r>
+                        <a:rPr lang="en-US" sz="4400" dirty="0">
+                          <a:ea typeface="Amazon Ember" panose="020B0603020204020204" pitchFamily="34" charset="0"/>
+                          <a:cs typeface="Amazon Ember" panose="020B0603020204020204" pitchFamily="34" charset="0"/>
+                        </a:rPr>
+                        <a:t>Cat: 98.99%,</a:t>
+                      </a:r>
+                    </a:p>
+                    <a:p>
+                      <a:pPr lvl="0" algn="l" fontAlgn="b"/>
+                      <a:r>
+                        <a:rPr lang="en-US" sz="4400" dirty="0">
+                          <a:ea typeface="Amazon Ember" panose="020B0603020204020204" pitchFamily="34" charset="0"/>
+                          <a:cs typeface="Amazon Ember" panose="020B0603020204020204" pitchFamily="34" charset="0"/>
+                        </a:rPr>
+                        <a:t>Whiskers: 88.04% Flooring: 65.02%</a:t>
+                      </a:r>
+                      <a:endParaRPr lang="en-US" sz="4400" b="0" i="0" u="none" strike="noStrike" dirty="0">
+                        <a:solidFill>
+                          <a:srgbClr val="000000"/>
+                        </a:solidFill>
+                        <a:latin typeface="Calibri"/>
+                      </a:endParaRPr>
+                    </a:p>
+                  </a:txBody>
+                  <a:tcPr anchor="ctr">
+                    <a:lnL w="38100" cap="flat" cmpd="sng" algn="ctr">
+                      <a:solidFill>
+                        <a:schemeClr val="tx1"/>
+                      </a:solidFill>
+                      <a:prstDash val="solid"/>
+                      <a:round/>
+                      <a:headEnd type="none" w="med" len="med"/>
+                      <a:tailEnd type="none" w="med" len="med"/>
+                    </a:lnL>
+                    <a:lnR w="38100" cap="flat" cmpd="sng" algn="ctr">
+                      <a:solidFill>
+                        <a:schemeClr val="tx1"/>
+                      </a:solidFill>
+                      <a:prstDash val="solid"/>
+                      <a:round/>
+                      <a:headEnd type="none" w="med" len="med"/>
+                      <a:tailEnd type="none" w="med" len="med"/>
+                    </a:lnR>
+                    <a:lnT w="38100" cap="flat" cmpd="sng" algn="ctr">
+                      <a:solidFill>
+                        <a:schemeClr val="tx1"/>
+                      </a:solidFill>
+                      <a:prstDash val="solid"/>
+                      <a:round/>
+                      <a:headEnd type="none" w="med" len="med"/>
+                      <a:tailEnd type="none" w="med" len="med"/>
+                    </a:lnT>
+                    <a:lnB w="38100" cap="flat" cmpd="sng" algn="ctr">
+                      <a:solidFill>
+                        <a:schemeClr val="tx1"/>
+                      </a:solidFill>
+                      <a:prstDash val="solid"/>
+                      <a:round/>
+                      <a:headEnd type="none" w="med" len="med"/>
+                      <a:tailEnd type="none" w="med" len="med"/>
+                    </a:lnB>
+                  </a:tcPr>
+                </a:tc>
+                <a:extLst>
+                  <a:ext uri="{0D108BD9-81ED-4DB2-BD59-A6C34878D82A}">
+                    <a16:rowId xmlns:a16="http://schemas.microsoft.com/office/drawing/2014/main" val="10001"/>
+                  </a:ext>
+                </a:extLst>
+              </a:tr>
+              <a:tr h="680085">
+                <a:tc vMerge="1">
+                  <a:txBody>
+                    <a:bodyPr/>
+                    <a:lstStyle/>
+                    <a:p>
+                      <a:pPr algn="r" fontAlgn="b"/>
+                      <a:endParaRPr lang="en-US" sz="3200" b="0" i="0" u="none" strike="noStrike" dirty="0">
+                        <a:solidFill>
+                          <a:srgbClr val="000000"/>
+                        </a:solidFill>
+                        <a:latin typeface="Calibri"/>
+                      </a:endParaRPr>
+                    </a:p>
+                  </a:txBody>
+                  <a:tcPr marL="9525" marR="9525" marT="9525" marB="0" anchor="b">
+                    <a:lnL w="12700" cap="flat" cmpd="sng" algn="ctr">
+                      <a:solidFill>
+                        <a:schemeClr val="tx1"/>
+                      </a:solidFill>
+                      <a:prstDash val="solid"/>
+                      <a:round/>
+                      <a:headEnd type="none" w="med" len="med"/>
+                      <a:tailEnd type="none" w="med" len="med"/>
+                    </a:lnL>
+                    <a:lnT w="12700" cap="flat" cmpd="sng" algn="ctr">
+                      <a:solidFill>
+                        <a:schemeClr val="tx1"/>
+                      </a:solidFill>
+                      <a:prstDash val="solid"/>
+                      <a:round/>
+                      <a:headEnd type="none" w="med" len="med"/>
+                      <a:tailEnd type="none" w="med" len="med"/>
+                    </a:lnT>
+                    <a:lnB w="12700" cap="flat" cmpd="sng" algn="ctr">
+                      <a:solidFill>
+                        <a:schemeClr val="tx1"/>
+                      </a:solidFill>
+                      <a:prstDash val="solid"/>
+                      <a:round/>
+                      <a:headEnd type="none" w="med" len="med"/>
+                      <a:tailEnd type="none" w="med" len="med"/>
+                    </a:lnB>
+                  </a:tcPr>
+                </a:tc>
+                <a:tc>
+                  <a:txBody>
+                    <a:bodyPr/>
+                    <a:lstStyle/>
+                    <a:p>
+                      <a:pPr lvl="0" algn="ctr" fontAlgn="b"/>
+                      <a:endParaRPr lang="en-US" sz="4400" b="0" i="0" u="none" strike="noStrike" dirty="0">
+                        <a:solidFill>
+                          <a:srgbClr val="000000"/>
+                        </a:solidFill>
+                        <a:latin typeface="Calibri"/>
+                      </a:endParaRPr>
+                    </a:p>
+                  </a:txBody>
+                  <a:tcPr anchor="ctr">
+                    <a:lnL w="38100" cap="flat" cmpd="sng" algn="ctr">
+                      <a:solidFill>
+                        <a:schemeClr val="tx1"/>
+                      </a:solidFill>
+                      <a:prstDash val="solid"/>
+                      <a:round/>
+                      <a:headEnd type="none" w="med" len="med"/>
+                      <a:tailEnd type="none" w="med" len="med"/>
+                    </a:lnL>
+                    <a:lnB w="38100" cap="flat" cmpd="sng" algn="ctr">
+                      <a:solidFill>
+                        <a:schemeClr val="tx1"/>
+                      </a:solidFill>
+                      <a:prstDash val="solid"/>
+                      <a:round/>
+                      <a:headEnd type="none" w="med" len="med"/>
+                      <a:tailEnd type="none" w="med" len="med"/>
+                    </a:lnB>
+                  </a:tcPr>
+                </a:tc>
+                <a:tc vMerge="1">
+                  <a:txBody>
+                    <a:bodyPr/>
+                    <a:lstStyle/>
+                    <a:p>
+                      <a:pPr lvl="0" algn="ctr" fontAlgn="b"/>
+                      <a:endParaRPr lang="en-US" sz="4400" b="0" i="0" u="none" strike="noStrike" dirty="0">
+                        <a:solidFill>
+                          <a:srgbClr val="000000"/>
+                        </a:solidFill>
+                        <a:latin typeface="Calibri"/>
+                      </a:endParaRPr>
+                    </a:p>
+                  </a:txBody>
+                  <a:tcPr marL="9525" marR="9525" marT="9525" marB="0" anchor="ctr">
+                    <a:lnR w="38100" cap="flat" cmpd="sng" algn="ctr">
+                      <a:solidFill>
+                        <a:schemeClr val="tx1"/>
+                      </a:solidFill>
+                      <a:prstDash val="solid"/>
+                      <a:round/>
+                      <a:headEnd type="none" w="med" len="med"/>
+                      <a:tailEnd type="none" w="med" len="med"/>
+                    </a:lnR>
+                    <a:lnB w="38100" cap="flat" cmpd="sng" algn="ctr">
+                      <a:solidFill>
+                        <a:schemeClr val="tx1"/>
+                      </a:solidFill>
+                      <a:prstDash val="solid"/>
+                      <a:round/>
+                      <a:headEnd type="none" w="med" len="med"/>
+                      <a:tailEnd type="none" w="med" len="med"/>
+                    </a:lnB>
+                  </a:tcPr>
+                </a:tc>
+                <a:tc vMerge="1">
+                  <a:txBody>
+                    <a:bodyPr/>
+                    <a:lstStyle/>
+                    <a:p>
+                      <a:pPr lvl="0" algn="ctr" fontAlgn="b"/>
+                      <a:endParaRPr lang="en-US" sz="4400" b="0" i="0" u="none" strike="noStrike" dirty="0">
+                        <a:solidFill>
+                          <a:srgbClr val="000000"/>
+                        </a:solidFill>
+                        <a:latin typeface="Calibri"/>
+                      </a:endParaRPr>
+                    </a:p>
+                  </a:txBody>
+                  <a:tcPr marL="9525" marR="9525" marT="9525" marB="0" anchor="ctr">
+                    <a:lnL w="38100" cap="flat" cmpd="sng" algn="ctr">
+                      <a:solidFill>
+                        <a:schemeClr val="tx1"/>
+                      </a:solidFill>
+                      <a:prstDash val="solid"/>
+                      <a:round/>
+                      <a:headEnd type="none" w="med" len="med"/>
+                      <a:tailEnd type="none" w="med" len="med"/>
+                    </a:lnL>
+                    <a:lnB w="38100" cap="flat" cmpd="sng" algn="ctr">
+                      <a:solidFill>
+                        <a:schemeClr val="tx1"/>
+                      </a:solidFill>
+                      <a:prstDash val="solid"/>
+                      <a:round/>
+                      <a:headEnd type="none" w="med" len="med"/>
+                      <a:tailEnd type="none" w="med" len="med"/>
+                    </a:lnB>
+                  </a:tcPr>
+                </a:tc>
+                <a:tc vMerge="1">
+                  <a:txBody>
+                    <a:bodyPr/>
+                    <a:lstStyle/>
+                    <a:p>
+                      <a:pPr lvl="0" algn="ctr" fontAlgn="b"/>
+                      <a:endParaRPr lang="en-US" sz="4400" b="0" i="0" u="none" strike="noStrike" dirty="0">
+                        <a:solidFill>
+                          <a:srgbClr val="000000"/>
+                        </a:solidFill>
+                        <a:latin typeface="Calibri"/>
+                      </a:endParaRPr>
+                    </a:p>
+                  </a:txBody>
+                  <a:tcPr marL="9525" marR="9525" marT="9525" marB="0" anchor="ctr">
+                    <a:lnL w="38100" cap="flat" cmpd="sng" algn="ctr">
+                      <a:solidFill>
+                        <a:schemeClr val="tx1"/>
+                      </a:solidFill>
+                      <a:prstDash val="solid"/>
+                      <a:round/>
+                      <a:headEnd type="none" w="med" len="med"/>
+                      <a:tailEnd type="none" w="med" len="med"/>
+                    </a:lnL>
+                    <a:lnB w="38100" cap="flat" cmpd="sng" algn="ctr">
+                      <a:solidFill>
+                        <a:schemeClr val="tx1"/>
+                      </a:solidFill>
+                      <a:prstDash val="solid"/>
+                      <a:round/>
+                      <a:headEnd type="none" w="med" len="med"/>
+                      <a:tailEnd type="none" w="med" len="med"/>
+                    </a:lnB>
+                  </a:tcPr>
+                </a:tc>
+                <a:tc vMerge="1">
+                  <a:txBody>
+                    <a:bodyPr/>
+                    <a:lstStyle/>
+                    <a:p>
+                      <a:pPr lvl="0" algn="ctr" fontAlgn="b"/>
+                      <a:endParaRPr lang="en-US" sz="4400" b="0" i="0" u="none" strike="noStrike" dirty="0">
+                        <a:solidFill>
+                          <a:srgbClr val="000000"/>
+                        </a:solidFill>
+                        <a:latin typeface="Calibri"/>
+                      </a:endParaRPr>
+                    </a:p>
+                  </a:txBody>
+                  <a:tcPr marL="9525" marR="9525" marT="9525" marB="0" anchor="ctr">
+                    <a:lnL w="38100" cap="flat" cmpd="sng" algn="ctr">
+                      <a:solidFill>
+                        <a:schemeClr val="tx1"/>
+                      </a:solidFill>
+                      <a:prstDash val="solid"/>
+                      <a:round/>
+                      <a:headEnd type="none" w="med" len="med"/>
+                      <a:tailEnd type="none" w="med" len="med"/>
+                    </a:lnL>
+                    <a:lnB w="38100" cap="flat" cmpd="sng" algn="ctr">
+                      <a:solidFill>
+                        <a:schemeClr val="tx1"/>
+                      </a:solidFill>
+                      <a:prstDash val="solid"/>
+                      <a:round/>
+                      <a:headEnd type="none" w="med" len="med"/>
+                      <a:tailEnd type="none" w="med" len="med"/>
+                    </a:lnB>
+                  </a:tcPr>
+                </a:tc>
+                <a:extLst>
+                  <a:ext uri="{0D108BD9-81ED-4DB2-BD59-A6C34878D82A}">
+                    <a16:rowId xmlns:a16="http://schemas.microsoft.com/office/drawing/2014/main" val="10002"/>
+                  </a:ext>
+                </a:extLst>
+              </a:tr>
+              <a:tr h="299380">
+                <a:tc gridSpan="6">
+                  <a:txBody>
+                    <a:bodyPr/>
+                    <a:lstStyle/>
+                    <a:p>
+                      <a:pPr lvl="0" algn="l" fontAlgn="b"/>
+                      <a:endParaRPr lang="en-US" sz="3200" b="0" i="0" u="none" strike="noStrike" dirty="0">
+                        <a:solidFill>
+                          <a:srgbClr val="000000"/>
+                        </a:solidFill>
+                        <a:latin typeface="Calibri"/>
+                      </a:endParaRPr>
+                    </a:p>
+                  </a:txBody>
+                  <a:tcPr marL="9525" marR="9525" marT="9525" marB="0" anchor="ctr">
+                    <a:lnL w="12700" cap="flat" cmpd="sng" algn="ctr">
+                      <a:noFill/>
+                      <a:prstDash val="solid"/>
+                      <a:round/>
+                      <a:headEnd type="none" w="med" len="med"/>
+                      <a:tailEnd type="none" w="med" len="med"/>
+                    </a:lnL>
+                    <a:lnR w="12700" cap="flat" cmpd="sng" algn="ctr">
+                      <a:noFill/>
+                      <a:prstDash val="solid"/>
+                      <a:round/>
+                      <a:headEnd type="none" w="med" len="med"/>
+                      <a:tailEnd type="none" w="med" len="med"/>
+                    </a:lnR>
+                    <a:lnT w="38100" cap="flat" cmpd="sng" algn="ctr">
+                      <a:solidFill>
+                        <a:schemeClr val="tx1"/>
+                      </a:solidFill>
+                      <a:prstDash val="solid"/>
+                      <a:round/>
+                      <a:headEnd type="none" w="med" len="med"/>
+                      <a:tailEnd type="none" w="med" len="med"/>
+                    </a:lnT>
+                    <a:lnB w="12700" cap="flat" cmpd="sng" algn="ctr">
+                      <a:noFill/>
+                      <a:prstDash val="solid"/>
+                      <a:round/>
+                      <a:headEnd type="none" w="med" len="med"/>
+                      <a:tailEnd type="none" w="med" len="med"/>
+                    </a:lnB>
+                    <a:lnTlToBr w="12700" cmpd="sng">
+                      <a:noFill/>
+                      <a:prstDash val="solid"/>
+                    </a:lnTlToBr>
+                    <a:lnBlToTr w="12700" cmpd="sng">
+                      <a:noFill/>
+                      <a:prstDash val="solid"/>
+                    </a:lnBlToTr>
+                  </a:tcPr>
+                </a:tc>
+                <a:tc hMerge="1">
+                  <a:txBody>
+                    <a:bodyPr/>
+                    <a:lstStyle/>
+                    <a:p>
+                      <a:pPr algn="r" fontAlgn="b"/>
+                      <a:endParaRPr lang="en-US" sz="3200" b="0" i="0" u="none" strike="noStrike">
+                        <a:solidFill>
+                          <a:srgbClr val="000000"/>
+                        </a:solidFill>
+                        <a:latin typeface="Calibri"/>
+                      </a:endParaRPr>
+                    </a:p>
+                  </a:txBody>
+                  <a:tcPr marL="9525" marR="9525" marT="9525" marB="0" anchor="b">
+                    <a:lnL w="12700" cap="flat" cmpd="sng" algn="ctr">
+                      <a:solidFill>
+                        <a:schemeClr val="tx1"/>
+                      </a:solidFill>
+                      <a:prstDash val="solid"/>
+                      <a:round/>
+                      <a:headEnd type="none" w="med" len="med"/>
+                      <a:tailEnd type="none" w="med" len="med"/>
+                    </a:lnL>
+                    <a:lnB w="12700" cap="flat" cmpd="sng" algn="ctr">
+                      <a:solidFill>
+                        <a:schemeClr val="tx1"/>
+                      </a:solidFill>
+                      <a:prstDash val="solid"/>
+                      <a:round/>
+                      <a:headEnd type="none" w="med" len="med"/>
+                      <a:tailEnd type="none" w="med" len="med"/>
+                    </a:lnB>
+                  </a:tcPr>
+                </a:tc>
+                <a:tc hMerge="1">
+                  <a:txBody>
+                    <a:bodyPr/>
+                    <a:lstStyle/>
+                    <a:p>
+                      <a:pPr algn="r" fontAlgn="b"/>
+                      <a:endParaRPr lang="en-US" sz="3200" b="0" i="0" u="none" strike="noStrike">
+                        <a:solidFill>
+                          <a:srgbClr val="000000"/>
+                        </a:solidFill>
+                        <a:latin typeface="Calibri"/>
+                      </a:endParaRPr>
+                    </a:p>
+                  </a:txBody>
+                  <a:tcPr marL="9525" marR="9525" marT="9525" marB="0" anchor="b">
+                    <a:lnR w="12700" cap="flat" cmpd="sng" algn="ctr">
+                      <a:solidFill>
+                        <a:schemeClr val="tx1"/>
+                      </a:solidFill>
+                      <a:prstDash val="solid"/>
+                      <a:round/>
+                      <a:headEnd type="none" w="med" len="med"/>
+                      <a:tailEnd type="none" w="med" len="med"/>
+                    </a:lnR>
+                    <a:lnB w="12700" cap="flat" cmpd="sng" algn="ctr">
+                      <a:solidFill>
+                        <a:schemeClr val="tx1"/>
+                      </a:solidFill>
+                      <a:prstDash val="solid"/>
+                      <a:round/>
+                      <a:headEnd type="none" w="med" len="med"/>
+                      <a:tailEnd type="none" w="med" len="med"/>
+                    </a:lnB>
+                  </a:tcPr>
+                </a:tc>
+                <a:tc hMerge="1">
+                  <a:txBody>
+                    <a:bodyPr/>
+                    <a:lstStyle/>
+                    <a:p>
+                      <a:pPr algn="r" fontAlgn="b"/>
+                      <a:endParaRPr lang="en-US" sz="3200" b="0" i="0" u="none" strike="noStrike">
+                        <a:solidFill>
+                          <a:srgbClr val="000000"/>
+                        </a:solidFill>
+                        <a:latin typeface="Calibri"/>
+                      </a:endParaRPr>
+                    </a:p>
+                  </a:txBody>
+                  <a:tcPr marL="9525" marR="9525" marT="9525" marB="0" anchor="b">
+                    <a:lnL w="12700" cap="flat" cmpd="sng" algn="ctr">
+                      <a:solidFill>
+                        <a:schemeClr val="tx1"/>
+                      </a:solidFill>
+                      <a:prstDash val="solid"/>
+                      <a:round/>
+                      <a:headEnd type="none" w="med" len="med"/>
+                      <a:tailEnd type="none" w="med" len="med"/>
+                    </a:lnL>
+                    <a:lnB w="12700" cap="flat" cmpd="sng" algn="ctr">
+                      <a:solidFill>
+                        <a:schemeClr val="tx1"/>
+                      </a:solidFill>
+                      <a:prstDash val="solid"/>
+                      <a:round/>
+                      <a:headEnd type="none" w="med" len="med"/>
+                      <a:tailEnd type="none" w="med" len="med"/>
+                    </a:lnB>
+                  </a:tcPr>
+                </a:tc>
+                <a:tc hMerge="1">
+                  <a:txBody>
+                    <a:bodyPr/>
+                    <a:lstStyle/>
+                    <a:p>
+                      <a:pPr algn="r" fontAlgn="b"/>
+                      <a:endParaRPr lang="en-US" sz="3200" b="0" i="0" u="none" strike="noStrike">
+                        <a:solidFill>
+                          <a:srgbClr val="000000"/>
+                        </a:solidFill>
+                        <a:latin typeface="Calibri"/>
+                      </a:endParaRPr>
+                    </a:p>
+                  </a:txBody>
+                  <a:tcPr marL="9525" marR="9525" marT="9525" marB="0" anchor="b">
+                    <a:lnL w="12700" cap="flat" cmpd="sng" algn="ctr">
+                      <a:solidFill>
+                        <a:schemeClr val="tx1"/>
+                      </a:solidFill>
+                      <a:prstDash val="solid"/>
+                      <a:round/>
+                      <a:headEnd type="none" w="med" len="med"/>
+                      <a:tailEnd type="none" w="med" len="med"/>
+                    </a:lnL>
+                    <a:lnB w="12700" cap="flat" cmpd="sng" algn="ctr">
+                      <a:solidFill>
+                        <a:schemeClr val="tx1"/>
+                      </a:solidFill>
+                      <a:prstDash val="solid"/>
+                      <a:round/>
+                      <a:headEnd type="none" w="med" len="med"/>
+                      <a:tailEnd type="none" w="med" len="med"/>
+                    </a:lnB>
+                  </a:tcPr>
+                </a:tc>
+                <a:tc hMerge="1">
+                  <a:txBody>
+                    <a:bodyPr/>
+                    <a:lstStyle/>
+                    <a:p>
+                      <a:pPr algn="r" fontAlgn="b"/>
+                      <a:endParaRPr lang="en-US" sz="3200" b="0" i="0" u="none" strike="noStrike">
+                        <a:solidFill>
+                          <a:srgbClr val="000000"/>
+                        </a:solidFill>
+                        <a:latin typeface="Calibri"/>
+                      </a:endParaRPr>
+                    </a:p>
+                  </a:txBody>
+                  <a:tcPr marL="9525" marR="9525" marT="9525" marB="0" anchor="b">
+                    <a:lnL w="12700" cap="flat" cmpd="sng" algn="ctr">
+                      <a:solidFill>
+                        <a:schemeClr val="tx1"/>
+                      </a:solidFill>
+                      <a:prstDash val="solid"/>
+                      <a:round/>
+                      <a:headEnd type="none" w="med" len="med"/>
+                      <a:tailEnd type="none" w="med" len="med"/>
+                    </a:lnL>
+                    <a:lnB w="12700" cap="flat" cmpd="sng" algn="ctr">
+                      <a:solidFill>
+                        <a:schemeClr val="tx1"/>
+                      </a:solidFill>
+                      <a:prstDash val="solid"/>
+                      <a:round/>
+                      <a:headEnd type="none" w="med" len="med"/>
+                      <a:tailEnd type="none" w="med" len="med"/>
+                    </a:lnB>
+                  </a:tcPr>
+                </a:tc>
+                <a:extLst>
+                  <a:ext uri="{0D108BD9-81ED-4DB2-BD59-A6C34878D82A}">
+                    <a16:rowId xmlns:a16="http://schemas.microsoft.com/office/drawing/2014/main" val="10003"/>
+                  </a:ext>
+                </a:extLst>
+              </a:tr>
+            </a:tbl>
+          </a:graphicData>
+        </a:graphic>
+      </p:graphicFrame>
     </p:spTree>
   </p:cSld>
   <p:clrMapOvr>

</xml_diff>

<commit_message>
Added Info about MobileNet and Summary
</commit_message>
<xml_diff>
--- a/HoltSkinnerPoster.pptx
+++ b/HoltSkinnerPoster.pptx
@@ -3045,6 +3045,14 @@
 <file path=ppt/slides/slide1.xml><?xml version="1.0" encoding="utf-8"?>
 <p:sld xmlns:a="http://schemas.openxmlformats.org/drawingml/2006/main" xmlns:r="http://schemas.openxmlformats.org/officeDocument/2006/relationships" xmlns:p="http://schemas.openxmlformats.org/presentationml/2006/main">
   <p:cSld>
+    <p:bg>
+      <p:bgPr>
+        <a:solidFill>
+          <a:srgbClr val="FFFADF"/>
+        </a:solidFill>
+        <a:effectLst/>
+      </p:bgPr>
+    </p:bg>
     <p:spTree>
       <p:nvGrpSpPr>
         <p:cNvPr id="1" name=""/>
@@ -3123,8 +3131,8 @@
         </p:nvSpPr>
         <p:spPr>
           <a:xfrm>
-            <a:off x="1646721" y="4251122"/>
-            <a:ext cx="16184079" cy="7620228"/>
+            <a:off x="866734" y="4045371"/>
+            <a:ext cx="18158422" cy="4398127"/>
           </a:xfrm>
           <a:prstGeom prst="rect">
             <a:avLst/>
@@ -3172,7 +3180,14 @@
                 <a:ea typeface="Amazon Ember" panose="020B0603020204020204" pitchFamily="34" charset="0"/>
                 <a:cs typeface="Amazon Ember" panose="020B0603020204020204" pitchFamily="34" charset="0"/>
               </a:rPr>
-              <a:t> There are a multitude of different Neural Network options for image classification</a:t>
+              <a:t> </a:t>
+            </a:r>
+            <a:r>
+              <a:rPr lang="en-US" sz="4000" dirty="0">
+                <a:ea typeface="Amazon Ember" panose="020B0603020204020204" pitchFamily="34" charset="0"/>
+                <a:cs typeface="Amazon Ember" panose="020B0603020204020204" pitchFamily="34" charset="0"/>
+              </a:rPr>
+              <a:t>There are a multitude of different Neural Network options for image classification</a:t>
             </a:r>
           </a:p>
           <a:p>
@@ -3184,7 +3199,7 @@
               <a:buChar char="🧠"/>
             </a:pPr>
             <a:r>
-              <a:rPr lang="en-US" sz="4400" dirty="0">
+              <a:rPr lang="en-US" sz="4000" dirty="0">
                 <a:ea typeface="Amazon Ember" panose="020B0603020204020204" pitchFamily="34" charset="0"/>
                 <a:cs typeface="Amazon Ember" panose="020B0603020204020204" pitchFamily="34" charset="0"/>
               </a:rPr>
@@ -3200,7 +3215,7 @@
               <a:buChar char="🧠"/>
             </a:pPr>
             <a:r>
-              <a:rPr lang="en-US" sz="4400" dirty="0">
+              <a:rPr lang="en-US" sz="4000" dirty="0">
                 <a:ea typeface="Amazon Ember" panose="020B0603020204020204" pitchFamily="34" charset="0"/>
                 <a:cs typeface="Amazon Ember" panose="020B0603020204020204" pitchFamily="34" charset="0"/>
               </a:rPr>
@@ -3237,7 +3252,7 @@
         </p:blipFill>
         <p:spPr>
           <a:xfrm>
-            <a:off x="19805143" y="5015648"/>
+            <a:off x="19834451" y="4243683"/>
             <a:ext cx="20276057" cy="6855701"/>
           </a:xfrm>
           <a:prstGeom prst="rect">
@@ -3259,8 +3274,8 @@
         </p:nvSpPr>
         <p:spPr>
           <a:xfrm>
-            <a:off x="1646721" y="12979961"/>
-            <a:ext cx="16184079" cy="11682878"/>
+            <a:off x="866734" y="9092929"/>
+            <a:ext cx="18176007" cy="9845772"/>
           </a:xfrm>
           <a:prstGeom prst="rect">
             <a:avLst/>
@@ -3304,21 +3319,21 @@
               <a:buChar char="🧠"/>
             </a:pPr>
             <a:r>
-              <a:rPr lang="en-US" sz="4400" dirty="0">
+              <a:rPr lang="en-US" sz="4000" dirty="0">
                 <a:ea typeface="Amazon Ember" panose="020B0603020204020204" pitchFamily="34" charset="0"/>
                 <a:cs typeface="Amazon Ember" panose="020B0603020204020204" pitchFamily="34" charset="0"/>
               </a:rPr>
               <a:t> Built and trained a Sequential Convolutional Neural Network in </a:t>
             </a:r>
             <a:r>
-              <a:rPr lang="en-US" sz="4400" dirty="0" err="1">
+              <a:rPr lang="en-US" sz="4000" dirty="0" err="1">
                 <a:ea typeface="Amazon Ember" panose="020B0603020204020204" pitchFamily="34" charset="0"/>
                 <a:cs typeface="Amazon Ember" panose="020B0603020204020204" pitchFamily="34" charset="0"/>
               </a:rPr>
               <a:t>Keras</a:t>
             </a:r>
             <a:r>
-              <a:rPr lang="en-US" sz="4400" dirty="0">
+              <a:rPr lang="en-US" sz="4000" dirty="0">
                 <a:ea typeface="Amazon Ember" panose="020B0603020204020204" pitchFamily="34" charset="0"/>
                 <a:cs typeface="Amazon Ember" panose="020B0603020204020204" pitchFamily="34" charset="0"/>
               </a:rPr>
@@ -3334,7 +3349,7 @@
               <a:buChar char="🧠"/>
             </a:pPr>
             <a:r>
-              <a:rPr lang="en-US" sz="4400" dirty="0">
+              <a:rPr lang="en-US" sz="4000" dirty="0">
                 <a:ea typeface="Amazon Ember" panose="020B0603020204020204" pitchFamily="34" charset="0"/>
                 <a:cs typeface="Amazon Ember" panose="020B0603020204020204" pitchFamily="34" charset="0"/>
               </a:rPr>
@@ -3350,7 +3365,7 @@
               <a:buChar char="🧠"/>
             </a:pPr>
             <a:r>
-              <a:rPr lang="en-US" sz="4400" dirty="0">
+              <a:rPr lang="en-US" sz="4000" dirty="0">
                 <a:ea typeface="Amazon Ember" panose="020B0603020204020204" pitchFamily="34" charset="0"/>
                 <a:cs typeface="Amazon Ember" panose="020B0603020204020204" pitchFamily="34" charset="0"/>
               </a:rPr>
@@ -3366,25 +3381,11 @@
               <a:buChar char="🧠"/>
             </a:pPr>
             <a:r>
-              <a:rPr lang="en-US" sz="4400" dirty="0">
+              <a:rPr lang="en-US" sz="4000" dirty="0">
                 <a:ea typeface="Amazon Ember" panose="020B0603020204020204" pitchFamily="34" charset="0"/>
                 <a:cs typeface="Amazon Ember" panose="020B0603020204020204" pitchFamily="34" charset="0"/>
               </a:rPr>
-              <a:t>Worked well on Dogs</a:t>
-            </a:r>
-            <a:r>
-              <a:rPr lang="en-US" sz="4400">
-                <a:ea typeface="Amazon Ember" panose="020B0603020204020204" pitchFamily="34" charset="0"/>
-                <a:cs typeface="Amazon Ember" panose="020B0603020204020204" pitchFamily="34" charset="0"/>
-              </a:rPr>
-              <a:t>, didn’t </a:t>
-            </a:r>
-            <a:r>
-              <a:rPr lang="en-US" sz="4400" dirty="0">
-                <a:ea typeface="Amazon Ember" panose="020B0603020204020204" pitchFamily="34" charset="0"/>
-                <a:cs typeface="Amazon Ember" panose="020B0603020204020204" pitchFamily="34" charset="0"/>
-              </a:rPr>
-              <a:t>work on Cats in Practice</a:t>
+              <a:t>Worked well on Dogs, didn’t work on Cats in Practice</a:t>
             </a:r>
           </a:p>
           <a:p>
@@ -3396,21 +3397,21 @@
               <a:buChar char="🧠"/>
             </a:pPr>
             <a:r>
-              <a:rPr lang="en-US" sz="4400" dirty="0">
+              <a:rPr lang="en-US" sz="4000" dirty="0">
                 <a:ea typeface="Amazon Ember" panose="020B0603020204020204" pitchFamily="34" charset="0"/>
                 <a:cs typeface="Amazon Ember" panose="020B0603020204020204" pitchFamily="34" charset="0"/>
               </a:rPr>
               <a:t>Pretrained ResNet50 and </a:t>
             </a:r>
             <a:r>
-              <a:rPr lang="en-US" sz="4400" dirty="0" err="1">
+              <a:rPr lang="en-US" sz="4000" dirty="0" err="1">
                 <a:ea typeface="Amazon Ember" panose="020B0603020204020204" pitchFamily="34" charset="0"/>
                 <a:cs typeface="Amazon Ember" panose="020B0603020204020204" pitchFamily="34" charset="0"/>
               </a:rPr>
               <a:t>MobileNet</a:t>
             </a:r>
             <a:r>
-              <a:rPr lang="en-US" sz="4400" dirty="0">
+              <a:rPr lang="en-US" sz="4000" dirty="0">
                 <a:ea typeface="Amazon Ember" panose="020B0603020204020204" pitchFamily="34" charset="0"/>
                 <a:cs typeface="Amazon Ember" panose="020B0603020204020204" pitchFamily="34" charset="0"/>
               </a:rPr>
@@ -3426,7 +3427,7 @@
               <a:buChar char="🧠"/>
             </a:pPr>
             <a:r>
-              <a:rPr lang="en-US" sz="4400" dirty="0">
+              <a:rPr lang="en-US" sz="4000" dirty="0">
                 <a:ea typeface="Amazon Ember" panose="020B0603020204020204" pitchFamily="34" charset="0"/>
                 <a:cs typeface="Amazon Ember" panose="020B0603020204020204" pitchFamily="34" charset="0"/>
               </a:rPr>
@@ -3442,7 +3443,7 @@
               <a:buChar char="🧠"/>
             </a:pPr>
             <a:r>
-              <a:rPr lang="en-US" sz="4400" dirty="0">
+              <a:rPr lang="en-US" sz="4000" dirty="0">
                 <a:ea typeface="Amazon Ember" panose="020B0603020204020204" pitchFamily="34" charset="0"/>
                 <a:cs typeface="Amazon Ember" panose="020B0603020204020204" pitchFamily="34" charset="0"/>
               </a:rPr>
@@ -3458,7 +3459,7 @@
               <a:buChar char="🧠"/>
             </a:pPr>
             <a:r>
-              <a:rPr lang="en-US" sz="4400" dirty="0">
+              <a:rPr lang="en-US" sz="4000" dirty="0">
                 <a:ea typeface="Amazon Ember" panose="020B0603020204020204" pitchFamily="34" charset="0"/>
                 <a:cs typeface="Amazon Ember" panose="020B0603020204020204" pitchFamily="34" charset="0"/>
               </a:rPr>
@@ -3495,8 +3496,8 @@
         </p:blipFill>
         <p:spPr>
           <a:xfrm>
-            <a:off x="19805143" y="12626504"/>
-            <a:ext cx="11027655" cy="8270742"/>
+            <a:off x="19828700" y="12075389"/>
+            <a:ext cx="10182266" cy="7636700"/>
           </a:xfrm>
           <a:prstGeom prst="rect">
             <a:avLst/>
@@ -3531,7 +3532,7 @@
         </p:blipFill>
         <p:spPr>
           <a:xfrm rot="5400000">
-            <a:off x="31091272" y="13968889"/>
+            <a:off x="33135258" y="13064317"/>
             <a:ext cx="7911423" cy="5933567"/>
           </a:xfrm>
           <a:prstGeom prst="rect">
@@ -3554,13 +3555,13 @@
           <p:nvPr>
             <p:extLst>
               <p:ext uri="{D42A27DB-BD31-4B8C-83A1-F6EECF244321}">
-                <p14:modId xmlns:p14="http://schemas.microsoft.com/office/powerpoint/2010/main" val="3586389773"/>
+                <p14:modId xmlns:p14="http://schemas.microsoft.com/office/powerpoint/2010/main" val="301220967"/>
               </p:ext>
             </p:extLst>
           </p:nvPr>
         </p:nvGraphicFramePr>
         <p:xfrm>
-          <a:off x="19042741" y="22250400"/>
+          <a:off x="19521870" y="23356359"/>
           <a:ext cx="20553468" cy="3379175"/>
         </p:xfrm>
         <a:graphic>
@@ -4758,6 +4759,42 @@
           </a:graphicData>
         </a:graphic>
       </p:graphicFrame>
+      <p:pic>
+        <p:nvPicPr>
+          <p:cNvPr id="13" name="Picture 12">
+            <a:extLst>
+              <a:ext uri="{FF2B5EF4-FFF2-40B4-BE49-F238E27FC236}">
+                <a16:creationId xmlns:a16="http://schemas.microsoft.com/office/drawing/2014/main" id="{5DED0498-D186-0742-8485-0FDA51F336D4}"/>
+              </a:ext>
+            </a:extLst>
+          </p:cNvPr>
+          <p:cNvPicPr>
+            <a:picLocks noChangeAspect="1"/>
+          </p:cNvPicPr>
+          <p:nvPr/>
+        </p:nvPicPr>
+        <p:blipFill>
+          <a:blip r:embed="rId5">
+            <a:extLst>
+              <a:ext uri="{28A0092B-C50C-407E-A947-70E740481C1C}">
+                <a14:useLocalDpi xmlns:a14="http://schemas.microsoft.com/office/drawing/2010/main" val="0"/>
+              </a:ext>
+            </a:extLst>
+          </a:blip>
+          <a:stretch>
+            <a:fillRect/>
+          </a:stretch>
+        </p:blipFill>
+        <p:spPr>
+          <a:xfrm>
+            <a:off x="866734" y="19980887"/>
+            <a:ext cx="18176008" cy="2767181"/>
+          </a:xfrm>
+          <a:prstGeom prst="rect">
+            <a:avLst/>
+          </a:prstGeom>
+        </p:spPr>
+      </p:pic>
     </p:spTree>
   </p:cSld>
   <p:clrMapOvr>

</xml_diff>

<commit_message>
Added More Info to Summary
</commit_message>
<xml_diff>
--- a/HoltSkinnerPoster.pptx
+++ b/HoltSkinnerPoster.pptx
@@ -3253,7 +3253,7 @@
         <p:spPr>
           <a:xfrm>
             <a:off x="19834451" y="4243683"/>
-            <a:ext cx="20276057" cy="6855701"/>
+            <a:ext cx="20246749" cy="6845791"/>
           </a:xfrm>
           <a:prstGeom prst="rect">
             <a:avLst/>
@@ -3415,7 +3415,7 @@
                 <a:ea typeface="Amazon Ember" panose="020B0603020204020204" pitchFamily="34" charset="0"/>
                 <a:cs typeface="Amazon Ember" panose="020B0603020204020204" pitchFamily="34" charset="0"/>
               </a:rPr>
-              <a:t> Models</a:t>
+              <a:t> Models </a:t>
             </a:r>
           </a:p>
           <a:p>
@@ -3496,7 +3496,7 @@
         </p:blipFill>
         <p:spPr>
           <a:xfrm>
-            <a:off x="19828700" y="12075389"/>
+            <a:off x="19834451" y="11687253"/>
             <a:ext cx="10182266" cy="7636700"/>
           </a:xfrm>
           <a:prstGeom prst="rect">
@@ -3532,7 +3532,7 @@
         </p:blipFill>
         <p:spPr>
           <a:xfrm rot="5400000">
-            <a:off x="33135258" y="13064317"/>
+            <a:off x="31091272" y="12714281"/>
             <a:ext cx="7911423" cy="5933567"/>
           </a:xfrm>
           <a:prstGeom prst="rect">
@@ -3555,13 +3555,13 @@
           <p:nvPr>
             <p:extLst>
               <p:ext uri="{D42A27DB-BD31-4B8C-83A1-F6EECF244321}">
-                <p14:modId xmlns:p14="http://schemas.microsoft.com/office/powerpoint/2010/main" val="301220967"/>
+                <p14:modId xmlns:p14="http://schemas.microsoft.com/office/powerpoint/2010/main" val="147832695"/>
               </p:ext>
             </p:extLst>
           </p:nvPr>
         </p:nvGraphicFramePr>
         <p:xfrm>
-          <a:off x="19521870" y="23356359"/>
+          <a:off x="19527732" y="20211101"/>
           <a:ext cx="20553468" cy="3379175"/>
         </p:xfrm>
         <a:graphic>
@@ -4787,8 +4787,8 @@
         </p:blipFill>
         <p:spPr>
           <a:xfrm>
-            <a:off x="866734" y="19980887"/>
-            <a:ext cx="18176008" cy="2767181"/>
+            <a:off x="990601" y="19731140"/>
+            <a:ext cx="18034556" cy="2745646"/>
           </a:xfrm>
           <a:prstGeom prst="rect">
             <a:avLst/>

</xml_diff>